<commit_message>
Changes to source code and presentation
</commit_message>
<xml_diff>
--- a/Dev-Ops Capstone Presentation (1).pptx
+++ b/Dev-Ops Capstone Presentation (1).pptx
@@ -269,7 +269,7 @@
               <a:rPr lang="en-AU" smtClean="0">
                 <a:latin typeface="Montserrat" pitchFamily="2" charset="0"/>
               </a:rPr>
-              <a:t>5/04/2023</a:t>
+              <a:t>12/04/2023</a:t>
             </a:fld>
             <a:endParaRPr lang="en-AU">
               <a:latin typeface="Montserrat" pitchFamily="2" charset="0"/>
@@ -475,7 +475,7 @@
             <a:fld id="{A9AD4FE1-8F22-D34C-8703-E8E84441DE9C}" type="datetimeFigureOut">
               <a:rPr lang="en-US" smtClean="0"/>
               <a:pPr/>
-              <a:t>4/5/2023</a:t>
+              <a:t>4/12/2023</a:t>
             </a:fld>
             <a:endParaRPr lang="en-US"/>
           </a:p>
@@ -808,7 +808,7 @@
           <a:p>
             <a:r>
               <a:rPr lang="en-GB" dirty="0"/>
-              <a:t>Please see the chat for a zipped copy of the hand out. </a:t>
+              <a:t>Please see the chat for a  copy of the hand out. </a:t>
             </a:r>
           </a:p>
         </p:txBody>
@@ -23286,7 +23286,7 @@
             <a:fld id="{DEAE47F9-1675-4044-AAD8-BB451DCE34A6}" type="datetimeFigureOut">
               <a:rPr lang="en-US" smtClean="0"/>
               <a:pPr/>
-              <a:t>4/5/2023</a:t>
+              <a:t>4/12/2023</a:t>
             </a:fld>
             <a:endParaRPr lang="en-US"/>
           </a:p>
@@ -23987,7 +23987,7 @@
             <a:fld id="{DEAE47F9-1675-4044-AAD8-BB451DCE34A6}" type="datetimeFigureOut">
               <a:rPr lang="en-US" smtClean="0"/>
               <a:pPr/>
-              <a:t>4/5/2023</a:t>
+              <a:t>4/12/2023</a:t>
             </a:fld>
             <a:endParaRPr lang="en-US"/>
           </a:p>
@@ -24690,7 +24690,7 @@
             <a:fld id="{DEAE47F9-1675-4044-AAD8-BB451DCE34A6}" type="datetimeFigureOut">
               <a:rPr lang="en-US" smtClean="0"/>
               <a:pPr/>
-              <a:t>4/5/2023</a:t>
+              <a:t>4/12/2023</a:t>
             </a:fld>
             <a:endParaRPr lang="en-US"/>
           </a:p>
@@ -34479,6 +34479,17 @@
 </file>
 
 <file path=customXml/item1.xml><?xml version="1.0" encoding="utf-8"?>
+<p:properties xmlns:p="http://schemas.microsoft.com/office/2006/metadata/properties" xmlns:xsi="http://www.w3.org/2001/XMLSchema-instance" xmlns:pc="http://schemas.microsoft.com/office/infopath/2007/PartnerControls">
+  <documentManagement>
+    <TaxCatchAll xmlns="0a96d139-f179-434b-8dff-7f6d26393868" xsi:nil="true"/>
+    <lcf76f155ced4ddcb4097134ff3c332f xmlns="31171297-1df8-4b24-a55f-abb35a5e24f6">
+      <Terms xmlns="http://schemas.microsoft.com/office/infopath/2007/PartnerControls"/>
+    </lcf76f155ced4ddcb4097134ff3c332f>
+  </documentManagement>
+</p:properties>
+</file>
+
+<file path=customXml/item2.xml><?xml version="1.0" encoding="utf-8"?>
 <ct:contentTypeSchema xmlns:ct="http://schemas.microsoft.com/office/2006/metadata/contentType" xmlns:ma="http://schemas.microsoft.com/office/2006/metadata/properties/metaAttributes" ct:_="" ma:_="" ma:contentTypeName="Document" ma:contentTypeID="0x010100FE1F3A30DAD9F14689267BCEB8248A35" ma:contentTypeVersion="16" ma:contentTypeDescription="Create a new document." ma:contentTypeScope="" ma:versionID="c8904ab512dc7a533a532967bc34b60b">
   <xsd:schema xmlns:xsd="http://www.w3.org/2001/XMLSchema" xmlns:xs="http://www.w3.org/2001/XMLSchema" xmlns:p="http://schemas.microsoft.com/office/2006/metadata/properties" xmlns:ns2="31171297-1df8-4b24-a55f-abb35a5e24f6" xmlns:ns3="0a96d139-f179-434b-8dff-7f6d26393868" targetNamespace="http://schemas.microsoft.com/office/2006/metadata/properties" ma:root="true" ma:fieldsID="2dd6a708dabaa74f699066e9d035bf95" ns2:_="" ns3:_="">
     <xsd:import namespace="31171297-1df8-4b24-a55f-abb35a5e24f6"/>
@@ -34721,17 +34732,6 @@
 </ct:contentTypeSchema>
 </file>
 
-<file path=customXml/item2.xml><?xml version="1.0" encoding="utf-8"?>
-<p:properties xmlns:p="http://schemas.microsoft.com/office/2006/metadata/properties" xmlns:xsi="http://www.w3.org/2001/XMLSchema-instance" xmlns:pc="http://schemas.microsoft.com/office/infopath/2007/PartnerControls">
-  <documentManagement>
-    <TaxCatchAll xmlns="0a96d139-f179-434b-8dff-7f6d26393868" xsi:nil="true"/>
-    <lcf76f155ced4ddcb4097134ff3c332f xmlns="31171297-1df8-4b24-a55f-abb35a5e24f6">
-      <Terms xmlns="http://schemas.microsoft.com/office/infopath/2007/PartnerControls"/>
-    </lcf76f155ced4ddcb4097134ff3c332f>
-  </documentManagement>
-</p:properties>
-</file>
-
 <file path=customXml/item3.xml><?xml version="1.0" encoding="utf-8"?>
 <?mso-contentType ?>
 <FormTemplates xmlns="http://schemas.microsoft.com/sharepoint/v3/contenttype/forms">
@@ -34742,6 +34742,17 @@
 </file>
 
 <file path=customXml/itemProps1.xml><?xml version="1.0" encoding="utf-8"?>
+<ds:datastoreItem xmlns:ds="http://schemas.openxmlformats.org/officeDocument/2006/customXml" ds:itemID="{A4A2FA48-F799-4AD1-B951-2D21CA0FFCC2}">
+  <ds:schemaRefs>
+    <ds:schemaRef ds:uri="http://schemas.microsoft.com/office/2006/metadata/properties"/>
+    <ds:schemaRef ds:uri="http://schemas.microsoft.com/office/infopath/2007/PartnerControls"/>
+    <ds:schemaRef ds:uri="0a96d139-f179-434b-8dff-7f6d26393868"/>
+    <ds:schemaRef ds:uri="31171297-1df8-4b24-a55f-abb35a5e24f6"/>
+  </ds:schemaRefs>
+</ds:datastoreItem>
+</file>
+
+<file path=customXml/itemProps2.xml><?xml version="1.0" encoding="utf-8"?>
 <ds:datastoreItem xmlns:ds="http://schemas.openxmlformats.org/officeDocument/2006/customXml" ds:itemID="{EB703059-7A74-434E-8913-31E0A794F7C5}">
   <ds:schemaRefs>
     <ds:schemaRef ds:uri="http://schemas.microsoft.com/office/2006/metadata/contentType"/>
@@ -34760,17 +34771,6 @@
 </ds:datastoreItem>
 </file>
 
-<file path=customXml/itemProps2.xml><?xml version="1.0" encoding="utf-8"?>
-<ds:datastoreItem xmlns:ds="http://schemas.openxmlformats.org/officeDocument/2006/customXml" ds:itemID="{A4A2FA48-F799-4AD1-B951-2D21CA0FFCC2}">
-  <ds:schemaRefs>
-    <ds:schemaRef ds:uri="http://schemas.microsoft.com/office/2006/metadata/properties"/>
-    <ds:schemaRef ds:uri="http://schemas.microsoft.com/office/infopath/2007/PartnerControls"/>
-    <ds:schemaRef ds:uri="0a96d139-f179-434b-8dff-7f6d26393868"/>
-    <ds:schemaRef ds:uri="31171297-1df8-4b24-a55f-abb35a5e24f6"/>
-  </ds:schemaRefs>
-</ds:datastoreItem>
-</file>
-
 <file path=customXml/itemProps3.xml><?xml version="1.0" encoding="utf-8"?>
 <ds:datastoreItem xmlns:ds="http://schemas.openxmlformats.org/officeDocument/2006/customXml" ds:itemID="{24AA0D7A-D3E0-436C-96FA-219A035EBE3A}">
   <ds:schemaRefs>

</xml_diff>